<commit_message>
Add content page to test_1 ppt
</commit_message>
<xml_diff>
--- a/server/temp/test_1.pptx
+++ b/server/temp/test_1.pptx
@@ -6,9 +6,11 @@
   </p:sldMasterIdLst>
   <p:sldIdLst>
     <p:sldId id="256" r:id="rId2"/>
-    <p:sldId id="257" r:id="rId3"/>
-    <p:sldId id="258" r:id="rId4"/>
-    <p:sldId id="259" r:id="rId5"/>
+    <p:sldId id="261" r:id="rId3"/>
+    <p:sldId id="257" r:id="rId4"/>
+    <p:sldId id="258" r:id="rId5"/>
+    <p:sldId id="259" r:id="rId6"/>
+    <p:sldId id="260" r:id="rId7"/>
   </p:sldIdLst>
   <p:sldSz cx="12192000" cy="6858000"/>
   <p:notesSz cx="6858000" cy="9144000"/>
@@ -2989,7 +2991,19 @@
           <a:p>
             <a:r>
               <a:rPr lang="nb-NO" dirty="0" smtClean="0"/>
-              <a:t>En fantastisk presentasjon</a:t>
+              <a:t>A </a:t>
+            </a:r>
+            <a:r>
+              <a:rPr lang="nb-NO" dirty="0" err="1" smtClean="0"/>
+              <a:t>fantastic</a:t>
+            </a:r>
+            <a:r>
+              <a:rPr lang="nb-NO" dirty="0" smtClean="0"/>
+              <a:t> </a:t>
+            </a:r>
+            <a:r>
+              <a:rPr lang="nb-NO" dirty="0" err="1" smtClean="0"/>
+              <a:t>presentation</a:t>
             </a:r>
             <a:endParaRPr lang="nb-NO" dirty="0"/>
           </a:p>
@@ -3012,7 +3026,11 @@
           <a:p>
             <a:r>
               <a:rPr lang="nb-NO" dirty="0" smtClean="0"/>
-              <a:t>Av meg</a:t>
+              <a:t>By </a:t>
+            </a:r>
+            <a:r>
+              <a:rPr lang="nb-NO" dirty="0" err="1" smtClean="0"/>
+              <a:t>me</a:t>
             </a:r>
             <a:endParaRPr lang="nb-NO" dirty="0"/>
           </a:p>
@@ -3065,7 +3083,7 @@
           <a:p>
             <a:r>
               <a:rPr lang="nb-NO" dirty="0" smtClean="0"/>
-              <a:t>Barn</a:t>
+              <a:t>Contents</a:t>
             </a:r>
             <a:endParaRPr lang="nb-NO" dirty="0"/>
           </a:p>
@@ -3087,46 +3105,35 @@
           <a:lstStyle/>
           <a:p>
             <a:r>
-              <a:rPr lang="nb-NO" dirty="0" smtClean="0"/>
-              <a:t>Små og søte</a:t>
-            </a:r>
-            <a:endParaRPr lang="nb-NO" dirty="0" smtClean="0"/>
-          </a:p>
-          <a:p>
-            <a:r>
-              <a:rPr lang="nb-NO" dirty="0" smtClean="0"/>
-              <a:t>Rampete eller de kan være snille</a:t>
-            </a:r>
-            <a:endParaRPr lang="nb-NO" dirty="0" smtClean="0"/>
-          </a:p>
-          <a:p>
-            <a:r>
-              <a:rPr lang="nb-NO" dirty="0" smtClean="0"/>
-              <a:t>Nysgjerrige, som ”nysgjerrige </a:t>
-            </a:r>
-            <a:r>
-              <a:rPr lang="nb-NO" dirty="0" err="1" smtClean="0"/>
-              <a:t>nils</a:t>
-            </a:r>
-            <a:r>
-              <a:rPr lang="nb-NO" dirty="0" smtClean="0"/>
-              <a:t>”</a:t>
-            </a:r>
-            <a:endParaRPr lang="nb-NO" dirty="0" smtClean="0"/>
-          </a:p>
-          <a:p>
-            <a:r>
-              <a:rPr lang="nb-NO" dirty="0" smtClean="0"/>
-              <a:t>Grinete trenger de ikke nødvendigvis å være</a:t>
-            </a:r>
-            <a:endParaRPr lang="nb-NO" dirty="0"/>
+              <a:rPr lang="en-GB" dirty="0" smtClean="0"/>
+              <a:t>Children</a:t>
+            </a:r>
+          </a:p>
+          <a:p>
+            <a:r>
+              <a:rPr lang="en-GB" dirty="0" smtClean="0"/>
+              <a:t>Data</a:t>
+            </a:r>
+          </a:p>
+          <a:p>
+            <a:r>
+              <a:rPr lang="en-GB" dirty="0" smtClean="0"/>
+              <a:t>Python</a:t>
+            </a:r>
+          </a:p>
+          <a:p>
+            <a:r>
+              <a:rPr lang="en-GB" dirty="0" smtClean="0"/>
+              <a:t>This one is without points</a:t>
+            </a:r>
+            <a:endParaRPr lang="en-GB" dirty="0"/>
           </a:p>
         </p:txBody>
       </p:sp>
     </p:spTree>
     <p:extLst>
       <p:ext uri="{BB962C8B-B14F-4D97-AF65-F5344CB8AC3E}">
-        <p14:creationId xmlns:p14="http://schemas.microsoft.com/office/powerpoint/2010/main" val="760132330"/>
+        <p14:creationId xmlns:p14="http://schemas.microsoft.com/office/powerpoint/2010/main" val="1271001010"/>
       </p:ext>
     </p:extLst>
   </p:cSld>
@@ -3169,8 +3176,8 @@
           <a:lstStyle/>
           <a:p>
             <a:r>
-              <a:rPr lang="nb-NO" dirty="0" smtClean="0"/>
-              <a:t>Data</a:t>
+              <a:rPr lang="nb-NO" dirty="0" err="1" smtClean="0"/>
+              <a:t>Children</a:t>
             </a:r>
             <a:endParaRPr lang="nb-NO" dirty="0"/>
           </a:p>
@@ -3192,64 +3199,35 @@
           <a:lstStyle/>
           <a:p>
             <a:r>
-              <a:rPr lang="nb-NO" dirty="0" smtClean="0"/>
-              <a:t>RAM</a:t>
-            </a:r>
-          </a:p>
-          <a:p>
-            <a:r>
-              <a:rPr lang="nb-NO" dirty="0" smtClean="0"/>
-              <a:t>SSD</a:t>
-            </a:r>
-          </a:p>
-          <a:p>
-            <a:pPr lvl="1"/>
-            <a:r>
-              <a:rPr lang="nb-NO" dirty="0" smtClean="0"/>
-              <a:t>Mye bedre enn en HDD</a:t>
-            </a:r>
-          </a:p>
-          <a:p>
-            <a:pPr lvl="1"/>
-            <a:r>
-              <a:rPr lang="nb-NO" dirty="0" smtClean="0"/>
-              <a:t>Raskere</a:t>
-            </a:r>
-          </a:p>
-          <a:p>
-            <a:pPr lvl="1"/>
-            <a:r>
-              <a:rPr lang="nb-NO" dirty="0" smtClean="0"/>
-              <a:t>Dyrere</a:t>
-            </a:r>
-          </a:p>
-          <a:p>
-            <a:pPr lvl="2"/>
-            <a:r>
-              <a:rPr lang="nb-NO" smtClean="0"/>
-              <a:t>Vanskeligere å lage</a:t>
-            </a:r>
-            <a:endParaRPr lang="nb-NO" dirty="0" smtClean="0"/>
-          </a:p>
-          <a:p>
-            <a:r>
-              <a:rPr lang="nb-NO" dirty="0" smtClean="0"/>
-              <a:t>CPU</a:t>
-            </a:r>
-          </a:p>
-          <a:p>
-            <a:r>
-              <a:rPr lang="nb-NO" dirty="0" err="1" smtClean="0"/>
-              <a:t>Cache</a:t>
-            </a:r>
-            <a:endParaRPr lang="nb-NO" dirty="0"/>
+              <a:rPr lang="en-US" dirty="0" smtClean="0"/>
+              <a:t>Little and cute</a:t>
+            </a:r>
+          </a:p>
+          <a:p>
+            <a:r>
+              <a:rPr lang="en-US" dirty="0" smtClean="0"/>
+              <a:t>They can be naughty or nice</a:t>
+            </a:r>
+          </a:p>
+          <a:p>
+            <a:r>
+              <a:rPr lang="en-US" dirty="0" smtClean="0"/>
+              <a:t>Curious as in ”curious Nils”</a:t>
+            </a:r>
+          </a:p>
+          <a:p>
+            <a:r>
+              <a:rPr lang="en-US" dirty="0" smtClean="0"/>
+              <a:t>Can be grumpy</a:t>
+            </a:r>
+            <a:endParaRPr lang="en-US" dirty="0"/>
           </a:p>
         </p:txBody>
       </p:sp>
     </p:spTree>
     <p:extLst>
       <p:ext uri="{BB962C8B-B14F-4D97-AF65-F5344CB8AC3E}">
-        <p14:creationId xmlns:p14="http://schemas.microsoft.com/office/powerpoint/2010/main" val="163854307"/>
+        <p14:creationId xmlns:p14="http://schemas.microsoft.com/office/powerpoint/2010/main" val="760132330"/>
       </p:ext>
     </p:extLst>
   </p:cSld>
@@ -3293,6 +3271,128 @@
           <a:p>
             <a:r>
               <a:rPr lang="nb-NO" dirty="0" smtClean="0"/>
+              <a:t>Data</a:t>
+            </a:r>
+            <a:endParaRPr lang="nb-NO" dirty="0"/>
+          </a:p>
+        </p:txBody>
+      </p:sp>
+      <p:sp>
+        <p:nvSpPr>
+          <p:cNvPr id="3" name="Plassholder for innhold 2"/>
+          <p:cNvSpPr>
+            <a:spLocks noGrp="1"/>
+          </p:cNvSpPr>
+          <p:nvPr>
+            <p:ph idx="1"/>
+          </p:nvPr>
+        </p:nvSpPr>
+        <p:spPr/>
+        <p:txBody>
+          <a:bodyPr/>
+          <a:lstStyle/>
+          <a:p>
+            <a:r>
+              <a:rPr lang="en-US" dirty="0" smtClean="0"/>
+              <a:t>RAM</a:t>
+            </a:r>
+          </a:p>
+          <a:p>
+            <a:r>
+              <a:rPr lang="en-US" dirty="0" smtClean="0"/>
+              <a:t>SSD</a:t>
+            </a:r>
+          </a:p>
+          <a:p>
+            <a:pPr lvl="1"/>
+            <a:r>
+              <a:rPr lang="en-US" dirty="0" smtClean="0"/>
+              <a:t>Much better than HDD</a:t>
+            </a:r>
+          </a:p>
+          <a:p>
+            <a:pPr lvl="1"/>
+            <a:r>
+              <a:rPr lang="en-US" dirty="0" smtClean="0"/>
+              <a:t>Faster</a:t>
+            </a:r>
+          </a:p>
+          <a:p>
+            <a:pPr lvl="1"/>
+            <a:r>
+              <a:rPr lang="en-US" dirty="0" smtClean="0"/>
+              <a:t>More expensive</a:t>
+            </a:r>
+          </a:p>
+          <a:p>
+            <a:pPr lvl="2"/>
+            <a:r>
+              <a:rPr lang="en-US" dirty="0" smtClean="0"/>
+              <a:t>Difficult to make</a:t>
+            </a:r>
+          </a:p>
+          <a:p>
+            <a:r>
+              <a:rPr lang="en-US" dirty="0" smtClean="0"/>
+              <a:t>CPU</a:t>
+            </a:r>
+          </a:p>
+          <a:p>
+            <a:r>
+              <a:rPr lang="en-US" dirty="0" smtClean="0"/>
+              <a:t>Cache</a:t>
+            </a:r>
+            <a:endParaRPr lang="en-US" dirty="0"/>
+          </a:p>
+        </p:txBody>
+      </p:sp>
+    </p:spTree>
+    <p:extLst>
+      <p:ext uri="{BB962C8B-B14F-4D97-AF65-F5344CB8AC3E}">
+        <p14:creationId xmlns:p14="http://schemas.microsoft.com/office/powerpoint/2010/main" val="163854307"/>
+      </p:ext>
+    </p:extLst>
+  </p:cSld>
+  <p:clrMapOvr>
+    <a:masterClrMapping/>
+  </p:clrMapOvr>
+</p:sld>
+</file>
+
+<file path=ppt/slides/slide5.xml><?xml version="1.0" encoding="utf-8"?>
+<p:sld xmlns:a="http://schemas.openxmlformats.org/drawingml/2006/main" xmlns:r="http://schemas.openxmlformats.org/officeDocument/2006/relationships" xmlns:p="http://schemas.openxmlformats.org/presentationml/2006/main">
+  <p:cSld>
+    <p:spTree>
+      <p:nvGrpSpPr>
+        <p:cNvPr id="1" name=""/>
+        <p:cNvGrpSpPr/>
+        <p:nvPr/>
+      </p:nvGrpSpPr>
+      <p:grpSpPr>
+        <a:xfrm>
+          <a:off x="0" y="0"/>
+          <a:ext cx="0" cy="0"/>
+          <a:chOff x="0" y="0"/>
+          <a:chExt cx="0" cy="0"/>
+        </a:xfrm>
+      </p:grpSpPr>
+      <p:sp>
+        <p:nvSpPr>
+          <p:cNvPr id="2" name="Tittel 1"/>
+          <p:cNvSpPr>
+            <a:spLocks noGrp="1"/>
+          </p:cNvSpPr>
+          <p:nvPr>
+            <p:ph type="title"/>
+          </p:nvPr>
+        </p:nvSpPr>
+        <p:spPr/>
+        <p:txBody>
+          <a:bodyPr/>
+          <a:lstStyle/>
+          <a:p>
+            <a:r>
+              <a:rPr lang="nb-NO" dirty="0" smtClean="0"/>
               <a:t>Python</a:t>
             </a:r>
             <a:endParaRPr lang="nb-NO" dirty="0"/>
@@ -3315,41 +3415,28 @@
           <a:lstStyle/>
           <a:p>
             <a:r>
-              <a:rPr lang="nb-NO" dirty="0" err="1" smtClean="0"/>
-              <a:t>Print</a:t>
-            </a:r>
-            <a:r>
-              <a:rPr lang="nb-NO" dirty="0" smtClean="0"/>
-              <a:t>()</a:t>
-            </a:r>
-          </a:p>
-          <a:p>
-            <a:r>
-              <a:rPr lang="nb-NO" dirty="0" smtClean="0"/>
-              <a:t>Prosedyreorientert, men kan også være </a:t>
-            </a:r>
-            <a:r>
-              <a:rPr lang="nb-NO" dirty="0" err="1" smtClean="0"/>
-              <a:t>o</a:t>
-            </a:r>
-            <a:r>
-              <a:rPr lang="nb-NO" smtClean="0"/>
-              <a:t>bjektorientert</a:t>
-            </a:r>
-            <a:endParaRPr lang="nb-NO" dirty="0" smtClean="0"/>
-          </a:p>
-          <a:p>
-            <a:r>
-              <a:rPr lang="nb-NO" dirty="0" smtClean="0"/>
-              <a:t>Greit førstespråk</a:t>
-            </a:r>
-          </a:p>
-          <a:p>
-            <a:r>
-              <a:rPr lang="nb-NO" dirty="0" smtClean="0"/>
-              <a:t>For-løkker er enkle å håndtere</a:t>
-            </a:r>
-            <a:endParaRPr lang="nb-NO" dirty="0"/>
+              <a:rPr lang="en-US" dirty="0" smtClean="0"/>
+              <a:t>Print()</a:t>
+            </a:r>
+          </a:p>
+          <a:p>
+            <a:r>
+              <a:rPr lang="en-US" dirty="0" smtClean="0"/>
+              <a:t>Procedural oriented, but can also be object oriented</a:t>
+            </a:r>
+          </a:p>
+          <a:p>
+            <a:r>
+              <a:rPr lang="en-US" dirty="0" smtClean="0"/>
+              <a:t>A good first language</a:t>
+            </a:r>
+          </a:p>
+          <a:p>
+            <a:r>
+              <a:rPr lang="en-US" dirty="0" smtClean="0"/>
+              <a:t>For-loops are simple to manage</a:t>
+            </a:r>
+            <a:endParaRPr lang="en-US" dirty="0"/>
           </a:p>
         </p:txBody>
       </p:sp>
@@ -3357,6 +3444,78 @@
     <p:extLst>
       <p:ext uri="{BB962C8B-B14F-4D97-AF65-F5344CB8AC3E}">
         <p14:creationId xmlns:p14="http://schemas.microsoft.com/office/powerpoint/2010/main" val="825302295"/>
+      </p:ext>
+    </p:extLst>
+  </p:cSld>
+  <p:clrMapOvr>
+    <a:masterClrMapping/>
+  </p:clrMapOvr>
+</p:sld>
+</file>
+
+<file path=ppt/slides/slide6.xml><?xml version="1.0" encoding="utf-8"?>
+<p:sld xmlns:a="http://schemas.openxmlformats.org/drawingml/2006/main" xmlns:r="http://schemas.openxmlformats.org/officeDocument/2006/relationships" xmlns:p="http://schemas.openxmlformats.org/presentationml/2006/main">
+  <p:cSld>
+    <p:spTree>
+      <p:nvGrpSpPr>
+        <p:cNvPr id="1" name=""/>
+        <p:cNvGrpSpPr/>
+        <p:nvPr/>
+      </p:nvGrpSpPr>
+      <p:grpSpPr>
+        <a:xfrm>
+          <a:off x="0" y="0"/>
+          <a:ext cx="0" cy="0"/>
+          <a:chOff x="0" y="0"/>
+          <a:chExt cx="0" cy="0"/>
+        </a:xfrm>
+      </p:grpSpPr>
+      <p:sp>
+        <p:nvSpPr>
+          <p:cNvPr id="2" name="Tittel 1"/>
+          <p:cNvSpPr>
+            <a:spLocks noGrp="1"/>
+          </p:cNvSpPr>
+          <p:nvPr>
+            <p:ph type="title"/>
+          </p:nvPr>
+        </p:nvSpPr>
+        <p:spPr/>
+        <p:txBody>
+          <a:bodyPr/>
+          <a:lstStyle/>
+          <a:p>
+            <a:r>
+              <a:rPr lang="en-GB" dirty="0" smtClean="0"/>
+              <a:t>This one is without points</a:t>
+            </a:r>
+            <a:endParaRPr lang="en-GB" dirty="0"/>
+          </a:p>
+        </p:txBody>
+      </p:sp>
+      <p:sp>
+        <p:nvSpPr>
+          <p:cNvPr id="3" name="Plassholder for innhold 2"/>
+          <p:cNvSpPr>
+            <a:spLocks noGrp="1"/>
+          </p:cNvSpPr>
+          <p:nvPr>
+            <p:ph idx="1"/>
+          </p:nvPr>
+        </p:nvSpPr>
+        <p:spPr/>
+        <p:txBody>
+          <a:bodyPr/>
+          <a:lstStyle/>
+          <a:p>
+            <a:endParaRPr lang="nb-NO" dirty="0"/>
+          </a:p>
+        </p:txBody>
+      </p:sp>
+    </p:spTree>
+    <p:extLst>
+      <p:ext uri="{BB962C8B-B14F-4D97-AF65-F5344CB8AC3E}">
+        <p14:creationId xmlns:p14="http://schemas.microsoft.com/office/powerpoint/2010/main" val="1607216627"/>
       </p:ext>
     </p:extLst>
   </p:cSld>

</xml_diff>

<commit_message>
Edit some class names and add support for answers per alternative in statistics.py
</commit_message>
<xml_diff>
--- a/server/temp/test_1.pptx
+++ b/server/temp/test_1.pptx
@@ -248,7 +248,7 @@
           <a:p>
             <a:fld id="{CF554FB8-CFBF-1447-B37A-55068622EB0B}" type="datetimeFigureOut">
               <a:rPr lang="nb-NO" smtClean="0"/>
-              <a:t>23.02.2017</a:t>
+              <a:t>24.04.2017</a:t>
             </a:fld>
             <a:endParaRPr lang="nb-NO"/>
           </a:p>
@@ -418,7 +418,7 @@
           <a:p>
             <a:fld id="{CF554FB8-CFBF-1447-B37A-55068622EB0B}" type="datetimeFigureOut">
               <a:rPr lang="nb-NO" smtClean="0"/>
-              <a:t>23.02.2017</a:t>
+              <a:t>24.04.2017</a:t>
             </a:fld>
             <a:endParaRPr lang="nb-NO"/>
           </a:p>
@@ -598,7 +598,7 @@
           <a:p>
             <a:fld id="{CF554FB8-CFBF-1447-B37A-55068622EB0B}" type="datetimeFigureOut">
               <a:rPr lang="nb-NO" smtClean="0"/>
-              <a:t>23.02.2017</a:t>
+              <a:t>24.04.2017</a:t>
             </a:fld>
             <a:endParaRPr lang="nb-NO"/>
           </a:p>
@@ -768,7 +768,7 @@
           <a:p>
             <a:fld id="{CF554FB8-CFBF-1447-B37A-55068622EB0B}" type="datetimeFigureOut">
               <a:rPr lang="nb-NO" smtClean="0"/>
-              <a:t>23.02.2017</a:t>
+              <a:t>24.04.2017</a:t>
             </a:fld>
             <a:endParaRPr lang="nb-NO"/>
           </a:p>
@@ -1014,7 +1014,7 @@
           <a:p>
             <a:fld id="{CF554FB8-CFBF-1447-B37A-55068622EB0B}" type="datetimeFigureOut">
               <a:rPr lang="nb-NO" smtClean="0"/>
-              <a:t>23.02.2017</a:t>
+              <a:t>24.04.2017</a:t>
             </a:fld>
             <a:endParaRPr lang="nb-NO"/>
           </a:p>
@@ -1246,7 +1246,7 @@
           <a:p>
             <a:fld id="{CF554FB8-CFBF-1447-B37A-55068622EB0B}" type="datetimeFigureOut">
               <a:rPr lang="nb-NO" smtClean="0"/>
-              <a:t>23.02.2017</a:t>
+              <a:t>24.04.2017</a:t>
             </a:fld>
             <a:endParaRPr lang="nb-NO"/>
           </a:p>
@@ -1613,7 +1613,7 @@
           <a:p>
             <a:fld id="{CF554FB8-CFBF-1447-B37A-55068622EB0B}" type="datetimeFigureOut">
               <a:rPr lang="nb-NO" smtClean="0"/>
-              <a:t>23.02.2017</a:t>
+              <a:t>24.04.2017</a:t>
             </a:fld>
             <a:endParaRPr lang="nb-NO"/>
           </a:p>
@@ -1731,7 +1731,7 @@
           <a:p>
             <a:fld id="{CF554FB8-CFBF-1447-B37A-55068622EB0B}" type="datetimeFigureOut">
               <a:rPr lang="nb-NO" smtClean="0"/>
-              <a:t>23.02.2017</a:t>
+              <a:t>24.04.2017</a:t>
             </a:fld>
             <a:endParaRPr lang="nb-NO"/>
           </a:p>
@@ -1826,7 +1826,7 @@
           <a:p>
             <a:fld id="{CF554FB8-CFBF-1447-B37A-55068622EB0B}" type="datetimeFigureOut">
               <a:rPr lang="nb-NO" smtClean="0"/>
-              <a:t>23.02.2017</a:t>
+              <a:t>24.04.2017</a:t>
             </a:fld>
             <a:endParaRPr lang="nb-NO"/>
           </a:p>
@@ -2103,7 +2103,7 @@
           <a:p>
             <a:fld id="{CF554FB8-CFBF-1447-B37A-55068622EB0B}" type="datetimeFigureOut">
               <a:rPr lang="nb-NO" smtClean="0"/>
-              <a:t>23.02.2017</a:t>
+              <a:t>24.04.2017</a:t>
             </a:fld>
             <a:endParaRPr lang="nb-NO"/>
           </a:p>
@@ -2356,7 +2356,7 @@
           <a:p>
             <a:fld id="{CF554FB8-CFBF-1447-B37A-55068622EB0B}" type="datetimeFigureOut">
               <a:rPr lang="nb-NO" smtClean="0"/>
-              <a:t>23.02.2017</a:t>
+              <a:t>24.04.2017</a:t>
             </a:fld>
             <a:endParaRPr lang="nb-NO"/>
           </a:p>
@@ -2569,7 +2569,7 @@
           <a:p>
             <a:fld id="{CF554FB8-CFBF-1447-B37A-55068622EB0B}" type="datetimeFigureOut">
               <a:rPr lang="nb-NO" smtClean="0"/>
-              <a:t>23.02.2017</a:t>
+              <a:t>24.04.2017</a:t>
             </a:fld>
             <a:endParaRPr lang="nb-NO"/>
           </a:p>
@@ -3179,6 +3179,10 @@
               <a:rPr lang="nb-NO" dirty="0" err="1" smtClean="0"/>
               <a:t>Children</a:t>
             </a:r>
+            <a:r>
+              <a:rPr lang="nb-NO" smtClean="0"/>
+              <a:t> and more</a:t>
+            </a:r>
             <a:endParaRPr lang="nb-NO" dirty="0"/>
           </a:p>
         </p:txBody>

</xml_diff>